<commit_message>
create some output figures
</commit_message>
<xml_diff>
--- a/paper/tex/fig/motivation.pptx
+++ b/paper/tex/fig/motivation.pptx
@@ -7,7 +7,7 @@
   <p:sldIdLst>
     <p:sldId id="256" r:id="rId2"/>
   </p:sldIdLst>
-  <p:sldSz cx="3095625" cy="1260475"/>
+  <p:sldSz cx="3095625" cy="1079500"/>
   <p:notesSz cx="7102475" cy="10233025"/>
   <p:custDataLst>
     <p:tags r:id="rId3"/>
@@ -110,7 +110,7 @@
   <p:extLst>
     <p:ext uri="{EFAFB233-063F-42B5-8137-9DF3F51BA10A}">
       <p15:sldGuideLst xmlns:p15="http://schemas.microsoft.com/office/powerpoint/2012/main">
-        <p15:guide id="1" orient="horz" pos="398" userDrawn="1">
+        <p15:guide id="1" orient="horz" pos="340" userDrawn="1">
           <p15:clr>
             <a:srgbClr val="A4A3A4"/>
           </p15:clr>
@@ -155,8 +155,8 @@
         </p:nvSpPr>
         <p:spPr>
           <a:xfrm>
-            <a:off x="232172" y="391564"/>
-            <a:ext cx="2631282" cy="270186"/>
+            <a:off x="232172" y="335344"/>
+            <a:ext cx="2631282" cy="231393"/>
           </a:xfrm>
         </p:spPr>
         <p:txBody>
@@ -183,8 +183,8 @@
         </p:nvSpPr>
         <p:spPr>
           <a:xfrm>
-            <a:off x="464345" y="714270"/>
-            <a:ext cx="2166937" cy="322121"/>
+            <a:off x="464349" y="611720"/>
+            <a:ext cx="2166937" cy="275872"/>
           </a:xfrm>
         </p:spPr>
         <p:txBody>
@@ -200,7 +200,7 @@
                 </a:solidFill>
               </a:defRPr>
             </a:lvl1pPr>
-            <a:lvl2pPr marL="516362" indent="0" algn="ctr">
+            <a:lvl2pPr marL="516347" indent="0" algn="ctr">
               <a:buNone/>
               <a:defRPr>
                 <a:solidFill>
@@ -210,7 +210,7 @@
                 </a:solidFill>
               </a:defRPr>
             </a:lvl2pPr>
-            <a:lvl3pPr marL="1032723" indent="0" algn="ctr">
+            <a:lvl3pPr marL="1032693" indent="0" algn="ctr">
               <a:buNone/>
               <a:defRPr>
                 <a:solidFill>
@@ -220,7 +220,7 @@
                 </a:solidFill>
               </a:defRPr>
             </a:lvl3pPr>
-            <a:lvl4pPr marL="1549085" indent="0" algn="ctr">
+            <a:lvl4pPr marL="1549040" indent="0" algn="ctr">
               <a:buNone/>
               <a:defRPr>
                 <a:solidFill>
@@ -230,7 +230,7 @@
                 </a:solidFill>
               </a:defRPr>
             </a:lvl4pPr>
-            <a:lvl5pPr marL="2065447" indent="0" algn="ctr">
+            <a:lvl5pPr marL="2065387" indent="0" algn="ctr">
               <a:buNone/>
               <a:defRPr>
                 <a:solidFill>
@@ -240,7 +240,7 @@
                 </a:solidFill>
               </a:defRPr>
             </a:lvl5pPr>
-            <a:lvl6pPr marL="2581808" indent="0" algn="ctr">
+            <a:lvl6pPr marL="2581733" indent="0" algn="ctr">
               <a:buNone/>
               <a:defRPr>
                 <a:solidFill>
@@ -250,7 +250,7 @@
                 </a:solidFill>
               </a:defRPr>
             </a:lvl6pPr>
-            <a:lvl7pPr marL="3098170" indent="0" algn="ctr">
+            <a:lvl7pPr marL="3098080" indent="0" algn="ctr">
               <a:buNone/>
               <a:defRPr>
                 <a:solidFill>
@@ -260,7 +260,7 @@
                 </a:solidFill>
               </a:defRPr>
             </a:lvl7pPr>
-            <a:lvl8pPr marL="3614532" indent="0" algn="ctr">
+            <a:lvl8pPr marL="3614427" indent="0" algn="ctr">
               <a:buNone/>
               <a:defRPr>
                 <a:solidFill>
@@ -270,7 +270,7 @@
                 </a:solidFill>
               </a:defRPr>
             </a:lvl8pPr>
-            <a:lvl9pPr marL="4130893" indent="0" algn="ctr">
+            <a:lvl9pPr marL="4130773" indent="0" algn="ctr">
               <a:buNone/>
               <a:defRPr>
                 <a:solidFill>
@@ -308,7 +308,7 @@
             <a:fld id="{CEEF7ADF-C373-4E12-BA8C-AAEE52A088DE}" type="datetimeFigureOut">
               <a:rPr lang="de-DE" smtClean="0"/>
               <a:pPr/>
-              <a:t>06.02.2020</a:t>
+              <a:t>26.02.2020</a:t>
             </a:fld>
             <a:endParaRPr lang="de-DE"/>
           </a:p>
@@ -475,7 +475,7 @@
             <a:fld id="{CEEF7ADF-C373-4E12-BA8C-AAEE52A088DE}" type="datetimeFigureOut">
               <a:rPr lang="de-DE" smtClean="0"/>
               <a:pPr/>
-              <a:t>06.02.2020</a:t>
+              <a:t>26.02.2020</a:t>
             </a:fld>
             <a:endParaRPr lang="de-DE"/>
           </a:p>
@@ -561,8 +561,8 @@
         </p:nvSpPr>
         <p:spPr>
           <a:xfrm>
-            <a:off x="2244331" y="50477"/>
-            <a:ext cx="696516" cy="1075489"/>
+            <a:off x="2244331" y="43230"/>
+            <a:ext cx="696516" cy="921074"/>
           </a:xfrm>
         </p:spPr>
         <p:txBody>
@@ -589,8 +589,8 @@
         </p:nvSpPr>
         <p:spPr>
           <a:xfrm>
-            <a:off x="154781" y="50477"/>
-            <a:ext cx="2037954" cy="1075489"/>
+            <a:off x="154781" y="43230"/>
+            <a:ext cx="2037954" cy="921074"/>
           </a:xfrm>
         </p:spPr>
         <p:txBody>
@@ -652,7 +652,7 @@
             <a:fld id="{CEEF7ADF-C373-4E12-BA8C-AAEE52A088DE}" type="datetimeFigureOut">
               <a:rPr lang="de-DE" smtClean="0"/>
               <a:pPr/>
-              <a:t>06.02.2020</a:t>
+              <a:t>26.02.2020</a:t>
             </a:fld>
             <a:endParaRPr lang="de-DE"/>
           </a:p>
@@ -819,7 +819,7 @@
             <a:fld id="{CEEF7ADF-C373-4E12-BA8C-AAEE52A088DE}" type="datetimeFigureOut">
               <a:rPr lang="de-DE" smtClean="0"/>
               <a:pPr/>
-              <a:t>06.02.2020</a:t>
+              <a:t>26.02.2020</a:t>
             </a:fld>
             <a:endParaRPr lang="de-DE"/>
           </a:p>
@@ -905,8 +905,8 @@
         </p:nvSpPr>
         <p:spPr>
           <a:xfrm>
-            <a:off x="244533" y="809972"/>
-            <a:ext cx="2631282" cy="250344"/>
+            <a:off x="244533" y="693679"/>
+            <a:ext cx="2631282" cy="214400"/>
           </a:xfrm>
         </p:spPr>
         <p:txBody>
@@ -937,8 +937,8 @@
         </p:nvSpPr>
         <p:spPr>
           <a:xfrm>
-            <a:off x="244533" y="534244"/>
-            <a:ext cx="2631282" cy="275729"/>
+            <a:off x="244533" y="457539"/>
+            <a:ext cx="2631282" cy="236141"/>
           </a:xfrm>
         </p:spPr>
         <p:txBody>
@@ -954,7 +954,7 @@
                 </a:solidFill>
               </a:defRPr>
             </a:lvl1pPr>
-            <a:lvl2pPr marL="516362" indent="0">
+            <a:lvl2pPr marL="516347" indent="0">
               <a:buNone/>
               <a:defRPr sz="2033">
                 <a:solidFill>
@@ -964,7 +964,7 @@
                 </a:solidFill>
               </a:defRPr>
             </a:lvl2pPr>
-            <a:lvl3pPr marL="1032723" indent="0">
+            <a:lvl3pPr marL="1032693" indent="0">
               <a:buNone/>
               <a:defRPr sz="1807">
                 <a:solidFill>
@@ -974,7 +974,7 @@
                 </a:solidFill>
               </a:defRPr>
             </a:lvl3pPr>
-            <a:lvl4pPr marL="1549085" indent="0">
+            <a:lvl4pPr marL="1549040" indent="0">
               <a:buNone/>
               <a:defRPr sz="1581">
                 <a:solidFill>
@@ -984,7 +984,7 @@
                 </a:solidFill>
               </a:defRPr>
             </a:lvl4pPr>
-            <a:lvl5pPr marL="2065447" indent="0">
+            <a:lvl5pPr marL="2065387" indent="0">
               <a:buNone/>
               <a:defRPr sz="1581">
                 <a:solidFill>
@@ -994,7 +994,7 @@
                 </a:solidFill>
               </a:defRPr>
             </a:lvl5pPr>
-            <a:lvl6pPr marL="2581808" indent="0">
+            <a:lvl6pPr marL="2581733" indent="0">
               <a:buNone/>
               <a:defRPr sz="1581">
                 <a:solidFill>
@@ -1004,7 +1004,7 @@
                 </a:solidFill>
               </a:defRPr>
             </a:lvl6pPr>
-            <a:lvl7pPr marL="3098170" indent="0">
+            <a:lvl7pPr marL="3098080" indent="0">
               <a:buNone/>
               <a:defRPr sz="1581">
                 <a:solidFill>
@@ -1014,7 +1014,7 @@
                 </a:solidFill>
               </a:defRPr>
             </a:lvl7pPr>
-            <a:lvl8pPr marL="3614532" indent="0">
+            <a:lvl8pPr marL="3614427" indent="0">
               <a:buNone/>
               <a:defRPr sz="1581">
                 <a:solidFill>
@@ -1024,7 +1024,7 @@
                 </a:solidFill>
               </a:defRPr>
             </a:lvl8pPr>
-            <a:lvl9pPr marL="4130893" indent="0">
+            <a:lvl9pPr marL="4130773" indent="0">
               <a:buNone/>
               <a:defRPr sz="1581">
                 <a:solidFill>
@@ -1062,7 +1062,7 @@
             <a:fld id="{CEEF7ADF-C373-4E12-BA8C-AAEE52A088DE}" type="datetimeFigureOut">
               <a:rPr lang="de-DE" smtClean="0"/>
               <a:pPr/>
-              <a:t>06.02.2020</a:t>
+              <a:t>26.02.2020</a:t>
             </a:fld>
             <a:endParaRPr lang="de-DE"/>
           </a:p>
@@ -1171,8 +1171,8 @@
         </p:nvSpPr>
         <p:spPr>
           <a:xfrm>
-            <a:off x="154784" y="294113"/>
-            <a:ext cx="1367235" cy="831855"/>
+            <a:off x="154788" y="251887"/>
+            <a:ext cx="1367235" cy="712420"/>
           </a:xfrm>
         </p:spPr>
         <p:txBody>
@@ -1256,8 +1256,8 @@
         </p:nvSpPr>
         <p:spPr>
           <a:xfrm>
-            <a:off x="1573611" y="294113"/>
-            <a:ext cx="1367235" cy="831855"/>
+            <a:off x="1573615" y="251887"/>
+            <a:ext cx="1367235" cy="712420"/>
           </a:xfrm>
         </p:spPr>
         <p:txBody>
@@ -1347,7 +1347,7 @@
             <a:fld id="{CEEF7ADF-C373-4E12-BA8C-AAEE52A088DE}" type="datetimeFigureOut">
               <a:rPr lang="de-DE" smtClean="0"/>
               <a:pPr/>
-              <a:t>06.02.2020</a:t>
+              <a:t>26.02.2020</a:t>
             </a:fld>
             <a:endParaRPr lang="de-DE"/>
           </a:p>
@@ -1460,8 +1460,8 @@
         </p:nvSpPr>
         <p:spPr>
           <a:xfrm>
-            <a:off x="154781" y="282148"/>
-            <a:ext cx="1367772" cy="117586"/>
+            <a:off x="154781" y="241638"/>
+            <a:ext cx="1367772" cy="100704"/>
           </a:xfrm>
         </p:spPr>
         <p:txBody>
@@ -1471,35 +1471,35 @@
               <a:buNone/>
               <a:defRPr sz="2711" b="1"/>
             </a:lvl1pPr>
-            <a:lvl2pPr marL="516362" indent="0">
+            <a:lvl2pPr marL="516347" indent="0">
               <a:buNone/>
               <a:defRPr sz="2259" b="1"/>
             </a:lvl2pPr>
-            <a:lvl3pPr marL="1032723" indent="0">
+            <a:lvl3pPr marL="1032693" indent="0">
               <a:buNone/>
               <a:defRPr sz="2033" b="1"/>
             </a:lvl3pPr>
-            <a:lvl4pPr marL="1549085" indent="0">
+            <a:lvl4pPr marL="1549040" indent="0">
               <a:buNone/>
               <a:defRPr sz="1807" b="1"/>
             </a:lvl4pPr>
-            <a:lvl5pPr marL="2065447" indent="0">
+            <a:lvl5pPr marL="2065387" indent="0">
               <a:buNone/>
               <a:defRPr sz="1807" b="1"/>
             </a:lvl5pPr>
-            <a:lvl6pPr marL="2581808" indent="0">
+            <a:lvl6pPr marL="2581733" indent="0">
               <a:buNone/>
               <a:defRPr sz="1807" b="1"/>
             </a:lvl6pPr>
-            <a:lvl7pPr marL="3098170" indent="0">
+            <a:lvl7pPr marL="3098080" indent="0">
               <a:buNone/>
               <a:defRPr sz="1807" b="1"/>
             </a:lvl7pPr>
-            <a:lvl8pPr marL="3614532" indent="0">
+            <a:lvl8pPr marL="3614427" indent="0">
               <a:buNone/>
               <a:defRPr sz="1807" b="1"/>
             </a:lvl8pPr>
-            <a:lvl9pPr marL="4130893" indent="0">
+            <a:lvl9pPr marL="4130773" indent="0">
               <a:buNone/>
               <a:defRPr sz="1807" b="1"/>
             </a:lvl9pPr>
@@ -1525,8 +1525,8 @@
         </p:nvSpPr>
         <p:spPr>
           <a:xfrm>
-            <a:off x="154781" y="399735"/>
-            <a:ext cx="1367772" cy="726232"/>
+            <a:off x="154781" y="342344"/>
+            <a:ext cx="1367772" cy="621962"/>
           </a:xfrm>
         </p:spPr>
         <p:txBody>
@@ -1610,8 +1610,8 @@
         </p:nvSpPr>
         <p:spPr>
           <a:xfrm>
-            <a:off x="1572538" y="282148"/>
-            <a:ext cx="1368309" cy="117586"/>
+            <a:off x="1572542" y="241638"/>
+            <a:ext cx="1368309" cy="100704"/>
           </a:xfrm>
         </p:spPr>
         <p:txBody>
@@ -1621,35 +1621,35 @@
               <a:buNone/>
               <a:defRPr sz="2711" b="1"/>
             </a:lvl1pPr>
-            <a:lvl2pPr marL="516362" indent="0">
+            <a:lvl2pPr marL="516347" indent="0">
               <a:buNone/>
               <a:defRPr sz="2259" b="1"/>
             </a:lvl2pPr>
-            <a:lvl3pPr marL="1032723" indent="0">
+            <a:lvl3pPr marL="1032693" indent="0">
               <a:buNone/>
               <a:defRPr sz="2033" b="1"/>
             </a:lvl3pPr>
-            <a:lvl4pPr marL="1549085" indent="0">
+            <a:lvl4pPr marL="1549040" indent="0">
               <a:buNone/>
               <a:defRPr sz="1807" b="1"/>
             </a:lvl4pPr>
-            <a:lvl5pPr marL="2065447" indent="0">
+            <a:lvl5pPr marL="2065387" indent="0">
               <a:buNone/>
               <a:defRPr sz="1807" b="1"/>
             </a:lvl5pPr>
-            <a:lvl6pPr marL="2581808" indent="0">
+            <a:lvl6pPr marL="2581733" indent="0">
               <a:buNone/>
               <a:defRPr sz="1807" b="1"/>
             </a:lvl6pPr>
-            <a:lvl7pPr marL="3098170" indent="0">
+            <a:lvl7pPr marL="3098080" indent="0">
               <a:buNone/>
               <a:defRPr sz="1807" b="1"/>
             </a:lvl7pPr>
-            <a:lvl8pPr marL="3614532" indent="0">
+            <a:lvl8pPr marL="3614427" indent="0">
               <a:buNone/>
               <a:defRPr sz="1807" b="1"/>
             </a:lvl8pPr>
-            <a:lvl9pPr marL="4130893" indent="0">
+            <a:lvl9pPr marL="4130773" indent="0">
               <a:buNone/>
               <a:defRPr sz="1807" b="1"/>
             </a:lvl9pPr>
@@ -1675,8 +1675,8 @@
         </p:nvSpPr>
         <p:spPr>
           <a:xfrm>
-            <a:off x="1572538" y="399735"/>
-            <a:ext cx="1368309" cy="726232"/>
+            <a:off x="1572542" y="342344"/>
+            <a:ext cx="1368309" cy="621962"/>
           </a:xfrm>
         </p:spPr>
         <p:txBody>
@@ -1766,7 +1766,7 @@
             <a:fld id="{CEEF7ADF-C373-4E12-BA8C-AAEE52A088DE}" type="datetimeFigureOut">
               <a:rPr lang="de-DE" smtClean="0"/>
               <a:pPr/>
-              <a:t>06.02.2020</a:t>
+              <a:t>26.02.2020</a:t>
             </a:fld>
             <a:endParaRPr lang="de-DE"/>
           </a:p>
@@ -1881,7 +1881,7 @@
             <a:fld id="{CEEF7ADF-C373-4E12-BA8C-AAEE52A088DE}" type="datetimeFigureOut">
               <a:rPr lang="de-DE" smtClean="0"/>
               <a:pPr/>
-              <a:t>06.02.2020</a:t>
+              <a:t>26.02.2020</a:t>
             </a:fld>
             <a:endParaRPr lang="de-DE"/>
           </a:p>
@@ -1973,7 +1973,7 @@
             <a:fld id="{CEEF7ADF-C373-4E12-BA8C-AAEE52A088DE}" type="datetimeFigureOut">
               <a:rPr lang="de-DE" smtClean="0"/>
               <a:pPr/>
-              <a:t>06.02.2020</a:t>
+              <a:t>26.02.2020</a:t>
             </a:fld>
             <a:endParaRPr lang="de-DE"/>
           </a:p>
@@ -2059,8 +2059,8 @@
         </p:nvSpPr>
         <p:spPr>
           <a:xfrm>
-            <a:off x="154784" y="50187"/>
-            <a:ext cx="1018439" cy="213580"/>
+            <a:off x="154788" y="42981"/>
+            <a:ext cx="1018439" cy="182915"/>
           </a:xfrm>
         </p:spPr>
         <p:txBody>
@@ -2091,8 +2091,8 @@
         </p:nvSpPr>
         <p:spPr>
           <a:xfrm>
-            <a:off x="1210304" y="50186"/>
-            <a:ext cx="1730540" cy="1075780"/>
+            <a:off x="1210304" y="42980"/>
+            <a:ext cx="1730540" cy="921323"/>
           </a:xfrm>
         </p:spPr>
         <p:txBody>
@@ -2176,8 +2176,8 @@
         </p:nvSpPr>
         <p:spPr>
           <a:xfrm>
-            <a:off x="154784" y="263767"/>
-            <a:ext cx="1018439" cy="862200"/>
+            <a:off x="154788" y="225896"/>
+            <a:ext cx="1018439" cy="738408"/>
           </a:xfrm>
         </p:spPr>
         <p:txBody>
@@ -2187,35 +2187,35 @@
               <a:buNone/>
               <a:defRPr sz="1581"/>
             </a:lvl1pPr>
-            <a:lvl2pPr marL="516362" indent="0">
+            <a:lvl2pPr marL="516347" indent="0">
               <a:buNone/>
               <a:defRPr sz="1355"/>
             </a:lvl2pPr>
-            <a:lvl3pPr marL="1032723" indent="0">
+            <a:lvl3pPr marL="1032693" indent="0">
               <a:buNone/>
               <a:defRPr sz="1129"/>
             </a:lvl3pPr>
-            <a:lvl4pPr marL="1549085" indent="0">
+            <a:lvl4pPr marL="1549040" indent="0">
               <a:buNone/>
               <a:defRPr sz="1016"/>
             </a:lvl4pPr>
-            <a:lvl5pPr marL="2065447" indent="0">
+            <a:lvl5pPr marL="2065387" indent="0">
               <a:buNone/>
               <a:defRPr sz="1016"/>
             </a:lvl5pPr>
-            <a:lvl6pPr marL="2581808" indent="0">
+            <a:lvl6pPr marL="2581733" indent="0">
               <a:buNone/>
               <a:defRPr sz="1016"/>
             </a:lvl6pPr>
-            <a:lvl7pPr marL="3098170" indent="0">
+            <a:lvl7pPr marL="3098080" indent="0">
               <a:buNone/>
               <a:defRPr sz="1016"/>
             </a:lvl7pPr>
-            <a:lvl8pPr marL="3614532" indent="0">
+            <a:lvl8pPr marL="3614427" indent="0">
               <a:buNone/>
               <a:defRPr sz="1016"/>
             </a:lvl8pPr>
-            <a:lvl9pPr marL="4130893" indent="0">
+            <a:lvl9pPr marL="4130773" indent="0">
               <a:buNone/>
               <a:defRPr sz="1016"/>
             </a:lvl9pPr>
@@ -2247,7 +2247,7 @@
             <a:fld id="{CEEF7ADF-C373-4E12-BA8C-AAEE52A088DE}" type="datetimeFigureOut">
               <a:rPr lang="de-DE" smtClean="0"/>
               <a:pPr/>
-              <a:t>06.02.2020</a:t>
+              <a:t>26.02.2020</a:t>
             </a:fld>
             <a:endParaRPr lang="de-DE"/>
           </a:p>
@@ -2333,8 +2333,8 @@
         </p:nvSpPr>
         <p:spPr>
           <a:xfrm>
-            <a:off x="606765" y="882334"/>
-            <a:ext cx="1857375" cy="104164"/>
+            <a:off x="606769" y="755651"/>
+            <a:ext cx="1857375" cy="89209"/>
           </a:xfrm>
         </p:spPr>
         <p:txBody>
@@ -2365,8 +2365,8 @@
         </p:nvSpPr>
         <p:spPr>
           <a:xfrm>
-            <a:off x="606765" y="112627"/>
-            <a:ext cx="1857375" cy="756285"/>
+            <a:off x="606769" y="96457"/>
+            <a:ext cx="1857375" cy="647700"/>
           </a:xfrm>
         </p:spPr>
         <p:txBody>
@@ -2376,35 +2376,35 @@
               <a:buNone/>
               <a:defRPr sz="3614"/>
             </a:lvl1pPr>
-            <a:lvl2pPr marL="516362" indent="0">
+            <a:lvl2pPr marL="516347" indent="0">
               <a:buNone/>
               <a:defRPr sz="3162"/>
             </a:lvl2pPr>
-            <a:lvl3pPr marL="1032723" indent="0">
+            <a:lvl3pPr marL="1032693" indent="0">
               <a:buNone/>
               <a:defRPr sz="2711"/>
             </a:lvl3pPr>
-            <a:lvl4pPr marL="1549085" indent="0">
+            <a:lvl4pPr marL="1549040" indent="0">
               <a:buNone/>
               <a:defRPr sz="2259"/>
             </a:lvl4pPr>
-            <a:lvl5pPr marL="2065447" indent="0">
+            <a:lvl5pPr marL="2065387" indent="0">
               <a:buNone/>
               <a:defRPr sz="2259"/>
             </a:lvl5pPr>
-            <a:lvl6pPr marL="2581808" indent="0">
+            <a:lvl6pPr marL="2581733" indent="0">
               <a:buNone/>
               <a:defRPr sz="2259"/>
             </a:lvl6pPr>
-            <a:lvl7pPr marL="3098170" indent="0">
+            <a:lvl7pPr marL="3098080" indent="0">
               <a:buNone/>
               <a:defRPr sz="2259"/>
             </a:lvl7pPr>
-            <a:lvl8pPr marL="3614532" indent="0">
+            <a:lvl8pPr marL="3614427" indent="0">
               <a:buNone/>
               <a:defRPr sz="2259"/>
             </a:lvl8pPr>
-            <a:lvl9pPr marL="4130893" indent="0">
+            <a:lvl9pPr marL="4130773" indent="0">
               <a:buNone/>
               <a:defRPr sz="2259"/>
             </a:lvl9pPr>
@@ -2430,8 +2430,8 @@
         </p:nvSpPr>
         <p:spPr>
           <a:xfrm>
-            <a:off x="606765" y="986497"/>
-            <a:ext cx="1857375" cy="147931"/>
+            <a:off x="606769" y="844861"/>
+            <a:ext cx="1857375" cy="126692"/>
           </a:xfrm>
         </p:spPr>
         <p:txBody>
@@ -2441,35 +2441,35 @@
               <a:buNone/>
               <a:defRPr sz="1581"/>
             </a:lvl1pPr>
-            <a:lvl2pPr marL="516362" indent="0">
+            <a:lvl2pPr marL="516347" indent="0">
               <a:buNone/>
               <a:defRPr sz="1355"/>
             </a:lvl2pPr>
-            <a:lvl3pPr marL="1032723" indent="0">
+            <a:lvl3pPr marL="1032693" indent="0">
               <a:buNone/>
               <a:defRPr sz="1129"/>
             </a:lvl3pPr>
-            <a:lvl4pPr marL="1549085" indent="0">
+            <a:lvl4pPr marL="1549040" indent="0">
               <a:buNone/>
               <a:defRPr sz="1016"/>
             </a:lvl4pPr>
-            <a:lvl5pPr marL="2065447" indent="0">
+            <a:lvl5pPr marL="2065387" indent="0">
               <a:buNone/>
               <a:defRPr sz="1016"/>
             </a:lvl5pPr>
-            <a:lvl6pPr marL="2581808" indent="0">
+            <a:lvl6pPr marL="2581733" indent="0">
               <a:buNone/>
               <a:defRPr sz="1016"/>
             </a:lvl6pPr>
-            <a:lvl7pPr marL="3098170" indent="0">
+            <a:lvl7pPr marL="3098080" indent="0">
               <a:buNone/>
               <a:defRPr sz="1016"/>
             </a:lvl7pPr>
-            <a:lvl8pPr marL="3614532" indent="0">
+            <a:lvl8pPr marL="3614427" indent="0">
               <a:buNone/>
               <a:defRPr sz="1016"/>
             </a:lvl8pPr>
-            <a:lvl9pPr marL="4130893" indent="0">
+            <a:lvl9pPr marL="4130773" indent="0">
               <a:buNone/>
               <a:defRPr sz="1016"/>
             </a:lvl9pPr>
@@ -2501,7 +2501,7 @@
             <a:fld id="{CEEF7ADF-C373-4E12-BA8C-AAEE52A088DE}" type="datetimeFigureOut">
               <a:rPr lang="de-DE" smtClean="0"/>
               <a:pPr/>
-              <a:t>06.02.2020</a:t>
+              <a:t>26.02.2020</a:t>
             </a:fld>
             <a:endParaRPr lang="de-DE"/>
           </a:p>
@@ -2592,20 +2592,20 @@
             </p:custDataLst>
             <p:extLst>
               <p:ext uri="{D42A27DB-BD31-4B8C-83A1-F6EECF244321}">
-                <p14:modId xmlns:p14="http://schemas.microsoft.com/office/powerpoint/2010/main" val="4231278781"/>
+                <p14:modId xmlns:p14="http://schemas.microsoft.com/office/powerpoint/2010/main" val="21544573"/>
               </p:ext>
             </p:extLst>
           </p:nvPr>
         </p:nvGraphicFramePr>
         <p:xfrm>
-          <a:off x="537" y="293"/>
-          <a:ext cx="538" cy="293"/>
+          <a:off x="537" y="253"/>
+          <a:ext cx="538" cy="251"/>
         </p:xfrm>
         <a:graphic>
           <a:graphicData uri="http://schemas.openxmlformats.org/presentationml/2006/ole">
             <mc:AlternateContent xmlns:mc="http://schemas.openxmlformats.org/markup-compatibility/2006">
               <mc:Choice xmlns:v="urn:schemas-microsoft-com:vml" Requires="v">
-                <p:oleObj spid="_x0000_s1045" name="think-cell Folie" r:id="rId16" imgW="384" imgH="384" progId="TCLayout.ActiveDocument.1">
+                <p:oleObj spid="_x0000_s1047" name="think-cell Folie" r:id="rId16" imgW="384" imgH="384" progId="TCLayout.ActiveDocument.1">
                   <p:embed/>
                 </p:oleObj>
               </mc:Choice>
@@ -2626,8 +2626,8 @@
                     </p:blipFill>
                     <p:spPr>
                       <a:xfrm>
-                        <a:off x="537" y="293"/>
-                        <a:ext cx="538" cy="293"/>
+                        <a:off x="537" y="253"/>
+                        <a:ext cx="538" cy="251"/>
                       </a:xfrm>
                       <a:prstGeom prst="rect">
                         <a:avLst/>
@@ -2653,7 +2653,7 @@
         <p:spPr>
           <a:xfrm>
             <a:off x="3" y="0"/>
-            <a:ext cx="53744" cy="29178"/>
+            <a:ext cx="53744" cy="24989"/>
           </a:xfrm>
           <a:prstGeom prst="rect">
             <a:avLst/>
@@ -2706,8 +2706,8 @@
         </p:nvSpPr>
         <p:spPr>
           <a:xfrm>
-            <a:off x="154782" y="50479"/>
-            <a:ext cx="2786063" cy="210079"/>
+            <a:off x="154786" y="43231"/>
+            <a:ext cx="2786063" cy="179917"/>
           </a:xfrm>
           <a:prstGeom prst="rect">
             <a:avLst/>
@@ -2739,8 +2739,8 @@
         </p:nvSpPr>
         <p:spPr>
           <a:xfrm>
-            <a:off x="154782" y="294113"/>
-            <a:ext cx="2786063" cy="831855"/>
+            <a:off x="154786" y="251887"/>
+            <a:ext cx="2786063" cy="712420"/>
           </a:xfrm>
           <a:prstGeom prst="rect">
             <a:avLst/>
@@ -2801,8 +2801,8 @@
         </p:nvSpPr>
         <p:spPr>
           <a:xfrm>
-            <a:off x="154784" y="1168274"/>
-            <a:ext cx="722312" cy="67109"/>
+            <a:off x="154784" y="1000537"/>
+            <a:ext cx="722312" cy="57474"/>
           </a:xfrm>
           <a:prstGeom prst="rect">
             <a:avLst/>
@@ -2825,7 +2825,7 @@
             <a:fld id="{CEEF7ADF-C373-4E12-BA8C-AAEE52A088DE}" type="datetimeFigureOut">
               <a:rPr lang="de-DE" smtClean="0"/>
               <a:pPr/>
-              <a:t>06.02.2020</a:t>
+              <a:t>26.02.2020</a:t>
             </a:fld>
             <a:endParaRPr lang="de-DE"/>
           </a:p>
@@ -2843,8 +2843,8 @@
         </p:nvSpPr>
         <p:spPr>
           <a:xfrm>
-            <a:off x="1057673" y="1168274"/>
-            <a:ext cx="980281" cy="67109"/>
+            <a:off x="1057677" y="1000537"/>
+            <a:ext cx="980281" cy="57474"/>
           </a:xfrm>
           <a:prstGeom prst="rect">
             <a:avLst/>
@@ -2880,8 +2880,8 @@
         </p:nvSpPr>
         <p:spPr>
           <a:xfrm>
-            <a:off x="2218535" y="1168274"/>
-            <a:ext cx="722312" cy="67109"/>
+            <a:off x="2218535" y="1000537"/>
+            <a:ext cx="722312" cy="57474"/>
           </a:xfrm>
           <a:prstGeom prst="rect">
             <a:avLst/>
@@ -2928,7 +2928,7 @@
   </p:sldLayoutIdLst>
   <p:txStyles>
     <p:titleStyle>
-      <a:lvl1pPr algn="ctr" defTabSz="1032723" rtl="0" eaLnBrk="1" latinLnBrk="0" hangingPunct="1">
+      <a:lvl1pPr algn="ctr" defTabSz="1032693" rtl="0" eaLnBrk="1" latinLnBrk="0" hangingPunct="1">
         <a:spcBef>
           <a:spcPct val="0"/>
         </a:spcBef>
@@ -2944,7 +2944,7 @@
       </a:lvl1pPr>
     </p:titleStyle>
     <p:bodyStyle>
-      <a:lvl1pPr marL="387271" indent="-387271" algn="l" defTabSz="1032723" rtl="0" eaLnBrk="1" latinLnBrk="0" hangingPunct="1">
+      <a:lvl1pPr marL="387260" indent="-387260" algn="l" defTabSz="1032693" rtl="0" eaLnBrk="1" latinLnBrk="0" hangingPunct="1">
         <a:spcBef>
           <a:spcPct val="20000"/>
         </a:spcBef>
@@ -2959,7 +2959,7 @@
           <a:cs typeface="Arial" pitchFamily="34" charset="0"/>
         </a:defRPr>
       </a:lvl1pPr>
-      <a:lvl2pPr marL="839088" indent="-322726" algn="l" defTabSz="1032723" rtl="0" eaLnBrk="1" latinLnBrk="0" hangingPunct="1">
+      <a:lvl2pPr marL="839064" indent="-322717" algn="l" defTabSz="1032693" rtl="0" eaLnBrk="1" latinLnBrk="0" hangingPunct="1">
         <a:spcBef>
           <a:spcPct val="20000"/>
         </a:spcBef>
@@ -2974,7 +2974,7 @@
           <a:cs typeface="Arial" pitchFamily="34" charset="0"/>
         </a:defRPr>
       </a:lvl2pPr>
-      <a:lvl3pPr marL="1290904" indent="-258181" algn="l" defTabSz="1032723" rtl="0" eaLnBrk="1" latinLnBrk="0" hangingPunct="1">
+      <a:lvl3pPr marL="1290866" indent="-258173" algn="l" defTabSz="1032693" rtl="0" eaLnBrk="1" latinLnBrk="0" hangingPunct="1">
         <a:spcBef>
           <a:spcPct val="20000"/>
         </a:spcBef>
@@ -2989,7 +2989,7 @@
           <a:cs typeface="Arial" pitchFamily="34" charset="0"/>
         </a:defRPr>
       </a:lvl3pPr>
-      <a:lvl4pPr marL="1807266" indent="-258181" algn="l" defTabSz="1032723" rtl="0" eaLnBrk="1" latinLnBrk="0" hangingPunct="1">
+      <a:lvl4pPr marL="1807213" indent="-258173" algn="l" defTabSz="1032693" rtl="0" eaLnBrk="1" latinLnBrk="0" hangingPunct="1">
         <a:spcBef>
           <a:spcPct val="20000"/>
         </a:spcBef>
@@ -3004,7 +3004,7 @@
           <a:cs typeface="Arial" pitchFamily="34" charset="0"/>
         </a:defRPr>
       </a:lvl4pPr>
-      <a:lvl5pPr marL="2323628" indent="-258181" algn="l" defTabSz="1032723" rtl="0" eaLnBrk="1" latinLnBrk="0" hangingPunct="1">
+      <a:lvl5pPr marL="2323560" indent="-258173" algn="l" defTabSz="1032693" rtl="0" eaLnBrk="1" latinLnBrk="0" hangingPunct="1">
         <a:spcBef>
           <a:spcPct val="20000"/>
         </a:spcBef>
@@ -3019,7 +3019,7 @@
           <a:cs typeface="Arial" pitchFamily="34" charset="0"/>
         </a:defRPr>
       </a:lvl5pPr>
-      <a:lvl6pPr marL="2839989" indent="-258181" algn="l" defTabSz="1032723" rtl="0" eaLnBrk="1" latinLnBrk="0" hangingPunct="1">
+      <a:lvl6pPr marL="2839906" indent="-258173" algn="l" defTabSz="1032693" rtl="0" eaLnBrk="1" latinLnBrk="0" hangingPunct="1">
         <a:spcBef>
           <a:spcPct val="20000"/>
         </a:spcBef>
@@ -3034,7 +3034,7 @@
           <a:cs typeface="+mn-cs"/>
         </a:defRPr>
       </a:lvl6pPr>
-      <a:lvl7pPr marL="3356351" indent="-258181" algn="l" defTabSz="1032723" rtl="0" eaLnBrk="1" latinLnBrk="0" hangingPunct="1">
+      <a:lvl7pPr marL="3356253" indent="-258173" algn="l" defTabSz="1032693" rtl="0" eaLnBrk="1" latinLnBrk="0" hangingPunct="1">
         <a:spcBef>
           <a:spcPct val="20000"/>
         </a:spcBef>
@@ -3049,7 +3049,7 @@
           <a:cs typeface="+mn-cs"/>
         </a:defRPr>
       </a:lvl7pPr>
-      <a:lvl8pPr marL="3872713" indent="-258181" algn="l" defTabSz="1032723" rtl="0" eaLnBrk="1" latinLnBrk="0" hangingPunct="1">
+      <a:lvl8pPr marL="3872600" indent="-258173" algn="l" defTabSz="1032693" rtl="0" eaLnBrk="1" latinLnBrk="0" hangingPunct="1">
         <a:spcBef>
           <a:spcPct val="20000"/>
         </a:spcBef>
@@ -3064,7 +3064,7 @@
           <a:cs typeface="+mn-cs"/>
         </a:defRPr>
       </a:lvl8pPr>
-      <a:lvl9pPr marL="4389074" indent="-258181" algn="l" defTabSz="1032723" rtl="0" eaLnBrk="1" latinLnBrk="0" hangingPunct="1">
+      <a:lvl9pPr marL="4388946" indent="-258173" algn="l" defTabSz="1032693" rtl="0" eaLnBrk="1" latinLnBrk="0" hangingPunct="1">
         <a:spcBef>
           <a:spcPct val="20000"/>
         </a:spcBef>
@@ -3084,7 +3084,7 @@
       <a:defPPr>
         <a:defRPr lang="de-DE"/>
       </a:defPPr>
-      <a:lvl1pPr marL="0" algn="l" defTabSz="1032723" rtl="0" eaLnBrk="1" latinLnBrk="0" hangingPunct="1">
+      <a:lvl1pPr marL="0" algn="l" defTabSz="1032693" rtl="0" eaLnBrk="1" latinLnBrk="0" hangingPunct="1">
         <a:defRPr sz="2033" kern="1200">
           <a:solidFill>
             <a:schemeClr val="tx1"/>
@@ -3094,7 +3094,7 @@
           <a:cs typeface="+mn-cs"/>
         </a:defRPr>
       </a:lvl1pPr>
-      <a:lvl2pPr marL="516362" algn="l" defTabSz="1032723" rtl="0" eaLnBrk="1" latinLnBrk="0" hangingPunct="1">
+      <a:lvl2pPr marL="516347" algn="l" defTabSz="1032693" rtl="0" eaLnBrk="1" latinLnBrk="0" hangingPunct="1">
         <a:defRPr sz="2033" kern="1200">
           <a:solidFill>
             <a:schemeClr val="tx1"/>
@@ -3104,7 +3104,7 @@
           <a:cs typeface="+mn-cs"/>
         </a:defRPr>
       </a:lvl2pPr>
-      <a:lvl3pPr marL="1032723" algn="l" defTabSz="1032723" rtl="0" eaLnBrk="1" latinLnBrk="0" hangingPunct="1">
+      <a:lvl3pPr marL="1032693" algn="l" defTabSz="1032693" rtl="0" eaLnBrk="1" latinLnBrk="0" hangingPunct="1">
         <a:defRPr sz="2033" kern="1200">
           <a:solidFill>
             <a:schemeClr val="tx1"/>
@@ -3114,7 +3114,7 @@
           <a:cs typeface="+mn-cs"/>
         </a:defRPr>
       </a:lvl3pPr>
-      <a:lvl4pPr marL="1549085" algn="l" defTabSz="1032723" rtl="0" eaLnBrk="1" latinLnBrk="0" hangingPunct="1">
+      <a:lvl4pPr marL="1549040" algn="l" defTabSz="1032693" rtl="0" eaLnBrk="1" latinLnBrk="0" hangingPunct="1">
         <a:defRPr sz="2033" kern="1200">
           <a:solidFill>
             <a:schemeClr val="tx1"/>
@@ -3124,7 +3124,7 @@
           <a:cs typeface="+mn-cs"/>
         </a:defRPr>
       </a:lvl4pPr>
-      <a:lvl5pPr marL="2065447" algn="l" defTabSz="1032723" rtl="0" eaLnBrk="1" latinLnBrk="0" hangingPunct="1">
+      <a:lvl5pPr marL="2065387" algn="l" defTabSz="1032693" rtl="0" eaLnBrk="1" latinLnBrk="0" hangingPunct="1">
         <a:defRPr sz="2033" kern="1200">
           <a:solidFill>
             <a:schemeClr val="tx1"/>
@@ -3134,7 +3134,7 @@
           <a:cs typeface="+mn-cs"/>
         </a:defRPr>
       </a:lvl5pPr>
-      <a:lvl6pPr marL="2581808" algn="l" defTabSz="1032723" rtl="0" eaLnBrk="1" latinLnBrk="0" hangingPunct="1">
+      <a:lvl6pPr marL="2581733" algn="l" defTabSz="1032693" rtl="0" eaLnBrk="1" latinLnBrk="0" hangingPunct="1">
         <a:defRPr sz="2033" kern="1200">
           <a:solidFill>
             <a:schemeClr val="tx1"/>
@@ -3144,7 +3144,7 @@
           <a:cs typeface="+mn-cs"/>
         </a:defRPr>
       </a:lvl6pPr>
-      <a:lvl7pPr marL="3098170" algn="l" defTabSz="1032723" rtl="0" eaLnBrk="1" latinLnBrk="0" hangingPunct="1">
+      <a:lvl7pPr marL="3098080" algn="l" defTabSz="1032693" rtl="0" eaLnBrk="1" latinLnBrk="0" hangingPunct="1">
         <a:defRPr sz="2033" kern="1200">
           <a:solidFill>
             <a:schemeClr val="tx1"/>
@@ -3154,7 +3154,7 @@
           <a:cs typeface="+mn-cs"/>
         </a:defRPr>
       </a:lvl7pPr>
-      <a:lvl8pPr marL="3614532" algn="l" defTabSz="1032723" rtl="0" eaLnBrk="1" latinLnBrk="0" hangingPunct="1">
+      <a:lvl8pPr marL="3614427" algn="l" defTabSz="1032693" rtl="0" eaLnBrk="1" latinLnBrk="0" hangingPunct="1">
         <a:defRPr sz="2033" kern="1200">
           <a:solidFill>
             <a:schemeClr val="tx1"/>
@@ -3164,7 +3164,7 @@
           <a:cs typeface="+mn-cs"/>
         </a:defRPr>
       </a:lvl8pPr>
-      <a:lvl9pPr marL="4130893" algn="l" defTabSz="1032723" rtl="0" eaLnBrk="1" latinLnBrk="0" hangingPunct="1">
+      <a:lvl9pPr marL="4130773" algn="l" defTabSz="1032693" rtl="0" eaLnBrk="1" latinLnBrk="0" hangingPunct="1">
         <a:defRPr sz="2033" kern="1200">
           <a:solidFill>
             <a:schemeClr val="tx1"/>
@@ -3208,7 +3208,7 @@
             </p:custDataLst>
             <p:extLst>
               <p:ext uri="{D42A27DB-BD31-4B8C-83A1-F6EECF244321}">
-                <p14:modId xmlns:p14="http://schemas.microsoft.com/office/powerpoint/2010/main" val="3637881198"/>
+                <p14:modId xmlns:p14="http://schemas.microsoft.com/office/powerpoint/2010/main" val="2545768819"/>
               </p:ext>
             </p:extLst>
           </p:nvPr>
@@ -3221,7 +3221,7 @@
           <a:graphicData uri="http://schemas.openxmlformats.org/presentationml/2006/ole">
             <mc:AlternateContent xmlns:mc="http://schemas.openxmlformats.org/markup-compatibility/2006">
               <mc:Choice xmlns:v="urn:schemas-microsoft-com:vml" Requires="v">
-                <p:oleObj spid="_x0000_s2069" name="think-cell Folie" r:id="rId4" imgW="384" imgH="384" progId="TCLayout.ActiveDocument.1">
+                <p:oleObj spid="_x0000_s2071" name="think-cell Folie" r:id="rId4" imgW="384" imgH="384" progId="TCLayout.ActiveDocument.1">
                   <p:embed/>
                 </p:oleObj>
               </mc:Choice>
@@ -3264,7 +3264,7 @@
         </p:nvCxnSpPr>
         <p:spPr>
           <a:xfrm flipV="1">
-            <a:off x="593644" y="135213"/>
+            <a:off x="593644" y="35694"/>
             <a:ext cx="0" cy="990048"/>
           </a:xfrm>
           <a:prstGeom prst="line">
@@ -3295,7 +3295,7 @@
         </p:nvCxnSpPr>
         <p:spPr>
           <a:xfrm flipV="1">
-            <a:off x="35644" y="630237"/>
+            <a:off x="35644" y="530717"/>
             <a:ext cx="1116000" cy="0"/>
           </a:xfrm>
           <a:prstGeom prst="line">
@@ -3328,7 +3328,7 @@
         </p:nvSpPr>
         <p:spPr>
           <a:xfrm>
-            <a:off x="572044" y="608637"/>
+            <a:off x="572044" y="509118"/>
             <a:ext cx="43200" cy="43200"/>
           </a:xfrm>
           <a:prstGeom prst="ellipse">
@@ -3406,7 +3406,7 @@
         </p:blipFill>
         <p:spPr>
           <a:xfrm>
-            <a:off x="1331788" y="79686"/>
+            <a:off x="1331791" y="0"/>
             <a:ext cx="1728191" cy="1057902"/>
           </a:xfrm>
           <a:prstGeom prst="rect">

</xml_diff>